<commit_message>
Changed the Command class to an abstract class
</commit_message>
<xml_diff>
--- a/slogo_UML.pptx
+++ b/slogo_UML.pptx
@@ -104,6 +104,22 @@
       </a:defRPr>
     </a:lvl9pPr>
   </p:defaultTextStyle>
+  <p:extLst>
+    <p:ext uri="{EFAFB233-063F-42B5-8137-9DF3F51BA10A}">
+      <p15:sldGuideLst xmlns:p15="http://schemas.microsoft.com/office/powerpoint/2012/main">
+        <p15:guide id="1" orient="horz" pos="2160">
+          <p15:clr>
+            <a:srgbClr val="A4A3A4"/>
+          </p15:clr>
+        </p15:guide>
+        <p15:guide id="2" pos="2880">
+          <p15:clr>
+            <a:srgbClr val="A4A3A4"/>
+          </p15:clr>
+        </p15:guide>
+      </p15:sldGuideLst>
+    </p:ext>
+  </p:extLst>
 </p:presentation>
 </file>
 
@@ -3742,24 +3758,202 @@
           </a:p>
         </p:txBody>
       </p:sp>
+      <p:sp>
+        <p:nvSpPr>
+          <p:cNvPr id="66" name="TextBox 65"/>
+          <p:cNvSpPr txBox="1"/>
+          <p:nvPr/>
+        </p:nvSpPr>
+        <p:spPr>
+          <a:xfrm>
+            <a:off x="4462841" y="6085668"/>
+            <a:ext cx="1231427" cy="369332"/>
+          </a:xfrm>
+          <a:prstGeom prst="rect">
+            <a:avLst/>
+          </a:prstGeom>
+          <a:noFill/>
+        </p:spPr>
+        <p:txBody>
+          <a:bodyPr wrap="none" rtlCol="0">
+            <a:spAutoFit/>
+          </a:bodyPr>
+          <a:lstStyle/>
+          <a:p>
+            <a:r>
+              <a:rPr lang="en-US" dirty="0" smtClean="0"/>
+              <a:t>Bad Strings</a:t>
+            </a:r>
+            <a:endParaRPr lang="en-US" dirty="0"/>
+          </a:p>
+        </p:txBody>
+      </p:sp>
+      <p:sp>
+        <p:nvSpPr>
+          <p:cNvPr id="67" name="TextBox 66"/>
+          <p:cNvSpPr txBox="1"/>
+          <p:nvPr/>
+        </p:nvSpPr>
+        <p:spPr>
+          <a:xfrm>
+            <a:off x="2895600" y="3733800"/>
+            <a:ext cx="1914307" cy="369332"/>
+          </a:xfrm>
+          <a:prstGeom prst="rect">
+            <a:avLst/>
+          </a:prstGeom>
+          <a:noFill/>
+        </p:spPr>
+        <p:txBody>
+          <a:bodyPr wrap="none" rtlCol="0">
+            <a:spAutoFit/>
+          </a:bodyPr>
+          <a:lstStyle/>
+          <a:p>
+            <a:r>
+              <a:rPr lang="en-US" dirty="0" smtClean="0"/>
+              <a:t>Command Objects</a:t>
+            </a:r>
+            <a:endParaRPr lang="en-US" dirty="0"/>
+          </a:p>
+        </p:txBody>
+      </p:sp>
+      <p:sp>
+        <p:nvSpPr>
+          <p:cNvPr id="68" name="TextBox 67"/>
+          <p:cNvSpPr txBox="1"/>
+          <p:nvPr/>
+        </p:nvSpPr>
+        <p:spPr>
+          <a:xfrm>
+            <a:off x="6430839" y="4158734"/>
+            <a:ext cx="2209579" cy="369332"/>
+          </a:xfrm>
+          <a:prstGeom prst="rect">
+            <a:avLst/>
+          </a:prstGeom>
+          <a:noFill/>
+        </p:spPr>
+        <p:txBody>
+          <a:bodyPr wrap="none" rtlCol="0">
+            <a:spAutoFit/>
+          </a:bodyPr>
+          <a:lstStyle/>
+          <a:p>
+            <a:r>
+              <a:rPr lang="en-US" dirty="0" smtClean="0"/>
+              <a:t>Command Executions</a:t>
+            </a:r>
+            <a:endParaRPr lang="en-US" dirty="0"/>
+          </a:p>
+        </p:txBody>
+      </p:sp>
+      <p:sp>
+        <p:nvSpPr>
+          <p:cNvPr id="69" name="TextBox 68"/>
+          <p:cNvSpPr txBox="1"/>
+          <p:nvPr/>
+        </p:nvSpPr>
+        <p:spPr>
+          <a:xfrm>
+            <a:off x="6248400" y="2362200"/>
+            <a:ext cx="1671933" cy="369332"/>
+          </a:xfrm>
+          <a:prstGeom prst="rect">
+            <a:avLst/>
+          </a:prstGeom>
+          <a:noFill/>
+        </p:spPr>
+        <p:txBody>
+          <a:bodyPr wrap="none" rtlCol="0">
+            <a:spAutoFit/>
+          </a:bodyPr>
+          <a:lstStyle/>
+          <a:p>
+            <a:r>
+              <a:rPr lang="en-US" dirty="0" smtClean="0"/>
+              <a:t>Physical Actions</a:t>
+            </a:r>
+            <a:endParaRPr lang="en-US" dirty="0"/>
+          </a:p>
+        </p:txBody>
+      </p:sp>
+      <p:sp>
+        <p:nvSpPr>
+          <p:cNvPr id="70" name="TextBox 69"/>
+          <p:cNvSpPr txBox="1"/>
+          <p:nvPr/>
+        </p:nvSpPr>
+        <p:spPr>
+          <a:xfrm>
+            <a:off x="5094558" y="1447800"/>
+            <a:ext cx="2113720" cy="369332"/>
+          </a:xfrm>
+          <a:prstGeom prst="rect">
+            <a:avLst/>
+          </a:prstGeom>
+          <a:noFill/>
+        </p:spPr>
+        <p:txBody>
+          <a:bodyPr wrap="none" rtlCol="0">
+            <a:spAutoFit/>
+          </a:bodyPr>
+          <a:lstStyle/>
+          <a:p>
+            <a:r>
+              <a:rPr lang="en-US" dirty="0" smtClean="0"/>
+              <a:t>Visual Interpretation</a:t>
+            </a:r>
+            <a:endParaRPr lang="en-US" dirty="0"/>
+          </a:p>
+        </p:txBody>
+      </p:sp>
+      <p:sp>
+        <p:nvSpPr>
+          <p:cNvPr id="71" name="TextBox 70"/>
+          <p:cNvSpPr txBox="1"/>
+          <p:nvPr/>
+        </p:nvSpPr>
+        <p:spPr>
+          <a:xfrm>
+            <a:off x="2234417" y="1506145"/>
+            <a:ext cx="1118383" cy="369332"/>
+          </a:xfrm>
+          <a:prstGeom prst="rect">
+            <a:avLst/>
+          </a:prstGeom>
+          <a:noFill/>
+        </p:spPr>
+        <p:txBody>
+          <a:bodyPr wrap="none" rtlCol="0">
+            <a:spAutoFit/>
+          </a:bodyPr>
+          <a:lstStyle/>
+          <a:p>
+            <a:r>
+              <a:rPr lang="en-US" dirty="0" smtClean="0"/>
+              <a:t>Text Input</a:t>
+            </a:r>
+            <a:endParaRPr lang="en-US" dirty="0"/>
+          </a:p>
+        </p:txBody>
+      </p:sp>
       <p:cxnSp>
         <p:nvCxnSpPr>
-          <p:cNvPr id="56" name="Elbow Connector 55"/>
-          <p:cNvCxnSpPr>
-            <a:stCxn id="9" idx="2"/>
-          </p:cNvCxnSpPr>
+          <p:cNvPr id="3" name="Straight Arrow Connector 2"/>
+          <p:cNvCxnSpPr/>
           <p:nvPr/>
         </p:nvCxnSpPr>
         <p:spPr>
-          <a:xfrm rot="16200000" flipH="1">
-            <a:off x="4675900" y="2579057"/>
-            <a:ext cx="711200" cy="7270567"/>
-          </a:xfrm>
-          <a:prstGeom prst="bentConnector2">
+          <a:xfrm flipH="1">
+            <a:off x="5893685" y="1875477"/>
+            <a:ext cx="2799465" cy="0"/>
+          </a:xfrm>
+          <a:prstGeom prst="straightConnector1">
             <a:avLst/>
           </a:prstGeom>
           <a:ln>
-            <a:tailEnd type="arrow"/>
+            <a:tailEnd type="triangle"/>
           </a:ln>
         </p:spPr>
         <p:style>
@@ -3779,23 +3973,20 @@
       </p:cxnSp>
       <p:cxnSp>
         <p:nvCxnSpPr>
-          <p:cNvPr id="63" name="Elbow Connector 62"/>
+          <p:cNvPr id="12" name="Straight Connector 11"/>
           <p:cNvCxnSpPr>
-            <a:endCxn id="6" idx="2"/>
+            <a:stCxn id="9" idx="2"/>
           </p:cNvCxnSpPr>
           <p:nvPr/>
         </p:nvCxnSpPr>
         <p:spPr>
-          <a:xfrm rot="10800000">
-            <a:off x="7467600" y="1447800"/>
-            <a:ext cx="1225550" cy="395988"/>
-          </a:xfrm>
-          <a:prstGeom prst="bentConnector2">
+          <a:xfrm>
+            <a:off x="1396217" y="5858741"/>
+            <a:ext cx="0" cy="596259"/>
+          </a:xfrm>
+          <a:prstGeom prst="line">
             <a:avLst/>
           </a:prstGeom>
-          <a:ln>
-            <a:tailEnd type="arrow"/>
-          </a:ln>
         </p:spPr>
         <p:style>
           <a:lnRef idx="1">
@@ -3812,203 +4003,50 @@
           </a:fontRef>
         </p:style>
       </p:cxnSp>
-      <p:sp>
-        <p:nvSpPr>
-          <p:cNvPr id="66" name="TextBox 65"/>
-          <p:cNvSpPr txBox="1"/>
-          <p:nvPr/>
-        </p:nvSpPr>
-        <p:spPr>
-          <a:xfrm>
-            <a:off x="4462841" y="6085668"/>
-            <a:ext cx="1231427" cy="369332"/>
-          </a:xfrm>
-          <a:prstGeom prst="rect">
-            <a:avLst/>
-          </a:prstGeom>
-          <a:noFill/>
-        </p:spPr>
-        <p:txBody>
-          <a:bodyPr wrap="none" rtlCol="0">
-            <a:spAutoFit/>
-          </a:bodyPr>
-          <a:lstStyle/>
-          <a:p>
-            <a:r>
-              <a:rPr lang="en-US" dirty="0" smtClean="0"/>
-              <a:t>Bad Strings</a:t>
-            </a:r>
-            <a:endParaRPr lang="en-US" dirty="0"/>
-          </a:p>
-        </p:txBody>
-      </p:sp>
-      <p:sp>
-        <p:nvSpPr>
-          <p:cNvPr id="67" name="TextBox 66"/>
-          <p:cNvSpPr txBox="1"/>
-          <p:nvPr/>
-        </p:nvSpPr>
-        <p:spPr>
-          <a:xfrm>
-            <a:off x="2895600" y="3733800"/>
-            <a:ext cx="1914307" cy="369332"/>
-          </a:xfrm>
-          <a:prstGeom prst="rect">
-            <a:avLst/>
-          </a:prstGeom>
-          <a:noFill/>
-        </p:spPr>
-        <p:txBody>
-          <a:bodyPr wrap="none" rtlCol="0">
-            <a:spAutoFit/>
-          </a:bodyPr>
-          <a:lstStyle/>
-          <a:p>
-            <a:r>
-              <a:rPr lang="en-US" dirty="0" smtClean="0"/>
-              <a:t>Command Objects</a:t>
-            </a:r>
-            <a:endParaRPr lang="en-US" dirty="0"/>
-          </a:p>
-        </p:txBody>
-      </p:sp>
-      <p:sp>
-        <p:nvSpPr>
-          <p:cNvPr id="68" name="TextBox 67"/>
-          <p:cNvSpPr txBox="1"/>
-          <p:nvPr/>
-        </p:nvSpPr>
-        <p:spPr>
-          <a:xfrm>
-            <a:off x="6430839" y="4158734"/>
-            <a:ext cx="2209579" cy="369332"/>
-          </a:xfrm>
-          <a:prstGeom prst="rect">
-            <a:avLst/>
-          </a:prstGeom>
-          <a:noFill/>
-        </p:spPr>
-        <p:txBody>
-          <a:bodyPr wrap="none" rtlCol="0">
-            <a:spAutoFit/>
-          </a:bodyPr>
-          <a:lstStyle/>
-          <a:p>
-            <a:r>
-              <a:rPr lang="en-US" dirty="0" smtClean="0"/>
-              <a:t>Command Executions</a:t>
-            </a:r>
-            <a:endParaRPr lang="en-US" dirty="0"/>
-          </a:p>
-        </p:txBody>
-      </p:sp>
-      <p:sp>
-        <p:nvSpPr>
-          <p:cNvPr id="69" name="TextBox 68"/>
-          <p:cNvSpPr txBox="1"/>
-          <p:nvPr/>
-        </p:nvSpPr>
-        <p:spPr>
-          <a:xfrm>
-            <a:off x="6248400" y="2362200"/>
-            <a:ext cx="1671933" cy="369332"/>
-          </a:xfrm>
-          <a:prstGeom prst="rect">
-            <a:avLst/>
-          </a:prstGeom>
-          <a:noFill/>
-        </p:spPr>
-        <p:txBody>
-          <a:bodyPr wrap="none" rtlCol="0">
-            <a:spAutoFit/>
-          </a:bodyPr>
-          <a:lstStyle/>
-          <a:p>
-            <a:r>
-              <a:rPr lang="en-US" dirty="0" smtClean="0"/>
-              <a:t>Physical Actions</a:t>
-            </a:r>
-            <a:endParaRPr lang="en-US" dirty="0"/>
-          </a:p>
-        </p:txBody>
-      </p:sp>
-      <p:sp>
-        <p:nvSpPr>
-          <p:cNvPr id="70" name="TextBox 69"/>
-          <p:cNvSpPr txBox="1"/>
-          <p:nvPr/>
-        </p:nvSpPr>
-        <p:spPr>
-          <a:xfrm>
-            <a:off x="5094558" y="1447800"/>
-            <a:ext cx="2113720" cy="369332"/>
-          </a:xfrm>
-          <a:prstGeom prst="rect">
-            <a:avLst/>
-          </a:prstGeom>
-          <a:noFill/>
-        </p:spPr>
-        <p:txBody>
-          <a:bodyPr wrap="none" rtlCol="0">
-            <a:spAutoFit/>
-          </a:bodyPr>
-          <a:lstStyle/>
-          <a:p>
-            <a:r>
-              <a:rPr lang="en-US" dirty="0" smtClean="0"/>
-              <a:t>Visual Interpretation</a:t>
-            </a:r>
-            <a:endParaRPr lang="en-US" dirty="0"/>
-          </a:p>
-        </p:txBody>
-      </p:sp>
-      <p:sp>
-        <p:nvSpPr>
-          <p:cNvPr id="71" name="TextBox 70"/>
-          <p:cNvSpPr txBox="1"/>
-          <p:nvPr/>
-        </p:nvSpPr>
-        <p:spPr>
-          <a:xfrm>
-            <a:off x="2234417" y="1506145"/>
-            <a:ext cx="1118383" cy="369332"/>
-          </a:xfrm>
-          <a:prstGeom prst="rect">
-            <a:avLst/>
-          </a:prstGeom>
-          <a:noFill/>
-        </p:spPr>
-        <p:txBody>
-          <a:bodyPr wrap="none" rtlCol="0">
-            <a:spAutoFit/>
-          </a:bodyPr>
-          <a:lstStyle/>
-          <a:p>
-            <a:r>
-              <a:rPr lang="en-US" dirty="0" smtClean="0"/>
-              <a:t>Text Input</a:t>
-            </a:r>
-            <a:endParaRPr lang="en-US" dirty="0"/>
-          </a:p>
-        </p:txBody>
-      </p:sp>
       <p:cxnSp>
         <p:nvCxnSpPr>
-          <p:cNvPr id="85" name="Straight Arrow Connector 84"/>
+          <p:cNvPr id="14" name="Straight Connector 13"/>
           <p:cNvCxnSpPr/>
           <p:nvPr/>
         </p:nvCxnSpPr>
         <p:spPr>
-          <a:xfrm flipV="1">
-            <a:off x="8693150" y="1843788"/>
-            <a:ext cx="0" cy="4726153"/>
-          </a:xfrm>
-          <a:prstGeom prst="straightConnector1">
+          <a:xfrm>
+            <a:off x="1396217" y="6455000"/>
+            <a:ext cx="7296933" cy="0"/>
+          </a:xfrm>
+          <a:prstGeom prst="line">
             <a:avLst/>
           </a:prstGeom>
-          <a:ln>
-            <a:tailEnd type="arrow"/>
-          </a:ln>
+        </p:spPr>
+        <p:style>
+          <a:lnRef idx="1">
+            <a:schemeClr val="accent1"/>
+          </a:lnRef>
+          <a:fillRef idx="0">
+            <a:schemeClr val="accent1"/>
+          </a:fillRef>
+          <a:effectRef idx="0">
+            <a:schemeClr val="accent1"/>
+          </a:effectRef>
+          <a:fontRef idx="minor">
+            <a:schemeClr val="tx1"/>
+          </a:fontRef>
+        </p:style>
+      </p:cxnSp>
+      <p:cxnSp>
+        <p:nvCxnSpPr>
+          <p:cNvPr id="18" name="Straight Connector 17"/>
+          <p:cNvCxnSpPr/>
+          <p:nvPr/>
+        </p:nvCxnSpPr>
+        <p:spPr>
+          <a:xfrm flipV="1">
+            <a:off x="8686800" y="1875477"/>
+            <a:ext cx="6350" cy="4579523"/>
+          </a:xfrm>
+          <a:prstGeom prst="line">
+            <a:avLst/>
+          </a:prstGeom>
         </p:spPr>
         <p:style>
           <a:lnRef idx="1">
@@ -4035,6 +4073,13 @@
   <p:clrMapOvr>
     <a:masterClrMapping/>
   </p:clrMapOvr>
+  <p:timing>
+    <p:tnLst>
+      <p:par>
+        <p:cTn id="1" dur="indefinite" restart="never" nodeType="tmRoot"/>
+      </p:par>
+    </p:tnLst>
+  </p:timing>
 </p:sld>
 </file>
 

</xml_diff>